<commit_message>
eskü utolsó frissített verzió
</commit_message>
<xml_diff>
--- a/F1_driver_standings_predictor.pptx
+++ b/F1_driver_standings_predictor.pptx
@@ -7,13 +7,12 @@
   <p:sldIdLst>
     <p:sldId id="256" r:id="rId2"/>
     <p:sldId id="257" r:id="rId3"/>
-    <p:sldId id="260" r:id="rId4"/>
-    <p:sldId id="262" r:id="rId5"/>
-    <p:sldId id="263" r:id="rId6"/>
-    <p:sldId id="264" r:id="rId7"/>
-    <p:sldId id="261" r:id="rId8"/>
-    <p:sldId id="259" r:id="rId9"/>
-    <p:sldId id="258" r:id="rId10"/>
+    <p:sldId id="262" r:id="rId4"/>
+    <p:sldId id="263" r:id="rId5"/>
+    <p:sldId id="264" r:id="rId6"/>
+    <p:sldId id="261" r:id="rId7"/>
+    <p:sldId id="259" r:id="rId8"/>
+    <p:sldId id="258" r:id="rId9"/>
   </p:sldIdLst>
   <p:sldSz cx="12192000" cy="6858000"/>
   <p:notesSz cx="6858000" cy="9144000"/>
@@ -123,7 +122,7 @@
 <file path=ppt/revisionInfo.xml><?xml version="1.0" encoding="utf-8"?>
 <p1510:revInfo xmlns:a="http://schemas.openxmlformats.org/drawingml/2006/main" xmlns:r="http://schemas.openxmlformats.org/officeDocument/2006/relationships" xmlns:p1510="http://schemas.microsoft.com/office/powerpoint/2015/10/main">
   <p1510:revLst>
-    <p1510:client id="{3CB0FE1A-4436-B3A2-EB38-110951C75BC1}" v="374" dt="2023-06-07T10:58:32.155"/>
+    <p1510:client id="{3CB0FE1A-4436-B3A2-EB38-110951C75BC1}" v="375" dt="2023-06-07T11:06:08.169"/>
     <p1510:client id="{9355CE9E-194A-DD48-0E0E-66152D2571B3}" v="200" dt="2023-05-31T11:07:47.638"/>
     <p1510:client id="{D87D98F3-8081-4ED7-886D-A52D1C1E23A0}" v="323" dt="2023-05-31T10:54:11.039"/>
   </p1510:revLst>
@@ -818,8 +817,8 @@
   </pc:docChgLst>
   <pc:docChgLst>
     <pc:chgData name="Sipos Dávid" userId="S::david.sipos@stud.uni-obuda.hu::33a32994-da80-4891-9b23-6e12fa1b238b" providerId="AD" clId="Web-{3CB0FE1A-4436-B3A2-EB38-110951C75BC1}"/>
-    <pc:docChg chg="addSld modSld">
-      <pc:chgData name="Sipos Dávid" userId="S::david.sipos@stud.uni-obuda.hu::33a32994-da80-4891-9b23-6e12fa1b238b" providerId="AD" clId="Web-{3CB0FE1A-4436-B3A2-EB38-110951C75BC1}" dt="2023-06-07T10:58:32.155" v="303" actId="20577"/>
+    <pc:docChg chg="addSld delSld modSld">
+      <pc:chgData name="Sipos Dávid" userId="S::david.sipos@stud.uni-obuda.hu::33a32994-da80-4891-9b23-6e12fa1b238b" providerId="AD" clId="Web-{3CB0FE1A-4436-B3A2-EB38-110951C75BC1}" dt="2023-06-07T11:06:08.169" v="304"/>
       <pc:docMkLst>
         <pc:docMk/>
       </pc:docMkLst>
@@ -868,6 +867,13 @@
             <ac:spMk id="6" creationId="{8E2CC2AC-F306-8B3C-AC41-786659836675}"/>
           </ac:spMkLst>
         </pc:spChg>
+      </pc:sldChg>
+      <pc:sldChg chg="del">
+        <pc:chgData name="Sipos Dávid" userId="S::david.sipos@stud.uni-obuda.hu::33a32994-da80-4891-9b23-6e12fa1b238b" providerId="AD" clId="Web-{3CB0FE1A-4436-B3A2-EB38-110951C75BC1}" dt="2023-06-07T11:06:08.169" v="304"/>
+        <pc:sldMkLst>
+          <pc:docMk/>
+          <pc:sldMk cId="549356452" sldId="260"/>
+        </pc:sldMkLst>
       </pc:sldChg>
       <pc:sldChg chg="addSp delSp modSp delAnim">
         <pc:chgData name="Sipos Dávid" userId="S::david.sipos@stud.uni-obuda.hu::33a32994-da80-4891-9b23-6e12fa1b238b" providerId="AD" clId="Web-{3CB0FE1A-4436-B3A2-EB38-110951C75BC1}" dt="2023-06-07T10:48:09.041" v="189" actId="1076"/>
@@ -1541,7 +1547,7 @@
           </a:lstStyle>
           <a:p>
             <a:r>
-              <a:rPr lang="en-US" dirty="0"/>
+              <a:rPr lang="en-US"/>
               <a:t>Click to edit Master title style</a:t>
             </a:r>
           </a:p>
@@ -1659,7 +1665,7 @@
           </a:lstStyle>
           <a:p>
             <a:r>
-              <a:rPr lang="en-US" dirty="0"/>
+              <a:rPr lang="en-US"/>
               <a:t>Click to edit Master subtitle style</a:t>
             </a:r>
           </a:p>
@@ -1685,7 +1691,7 @@
               <a:pPr/>
               <a:t>6/7/2023</a:t>
             </a:fld>
-            <a:endParaRPr lang="en-US" dirty="0"/>
+            <a:endParaRPr lang="en-US"/>
           </a:p>
         </p:txBody>
       </p:sp>
@@ -1709,7 +1715,7 @@
           <a:bodyPr/>
           <a:lstStyle/>
           <a:p>
-            <a:endParaRPr lang="en-US" dirty="0"/>
+            <a:endParaRPr lang="en-US"/>
           </a:p>
         </p:txBody>
       </p:sp>
@@ -1733,7 +1739,7 @@
               <a:pPr/>
               <a:t>‹#›</a:t>
             </a:fld>
-            <a:endParaRPr lang="en-US" dirty="0"/>
+            <a:endParaRPr lang="en-US"/>
           </a:p>
         </p:txBody>
       </p:sp>
@@ -1794,7 +1800,7 @@
           </a:lstStyle>
           <a:p>
             <a:r>
-              <a:rPr lang="en-US" dirty="0"/>
+              <a:rPr lang="en-US"/>
               <a:t>Click to edit Master title style</a:t>
             </a:r>
           </a:p>
@@ -1887,7 +1893,7 @@
             </a:lvl9pPr>
           </a:lstStyle>
           <a:p>
-            <a:endParaRPr lang="en-US" dirty="0"/>
+            <a:endParaRPr lang="en-US"/>
           </a:p>
         </p:txBody>
       </p:sp>
@@ -1952,7 +1958,7 @@
           <a:p>
             <a:pPr lvl="0"/>
             <a:r>
-              <a:rPr lang="en-US" dirty="0"/>
+              <a:rPr lang="en-US"/>
               <a:t>Click to edit Master text styles</a:t>
             </a:r>
           </a:p>
@@ -1978,7 +1984,7 @@
               <a:pPr/>
               <a:t>6/7/2023</a:t>
             </a:fld>
-            <a:endParaRPr lang="en-US" dirty="0"/>
+            <a:endParaRPr lang="en-US"/>
           </a:p>
         </p:txBody>
       </p:sp>
@@ -1997,7 +2003,7 @@
           <a:bodyPr/>
           <a:lstStyle/>
           <a:p>
-            <a:endParaRPr lang="en-US" dirty="0"/>
+            <a:endParaRPr lang="en-US"/>
           </a:p>
         </p:txBody>
       </p:sp>
@@ -2021,7 +2027,7 @@
               <a:pPr/>
               <a:t>‹#›</a:t>
             </a:fld>
-            <a:endParaRPr lang="en-US" dirty="0"/>
+            <a:endParaRPr lang="en-US"/>
           </a:p>
         </p:txBody>
       </p:sp>
@@ -2082,7 +2088,7 @@
           </a:lstStyle>
           <a:p>
             <a:r>
-              <a:rPr lang="en-US" dirty="0"/>
+              <a:rPr lang="en-US"/>
               <a:t>Click to edit Master title style</a:t>
             </a:r>
           </a:p>
@@ -2201,7 +2207,7 @@
           <a:p>
             <a:pPr lvl="0"/>
             <a:r>
-              <a:rPr lang="en-US" dirty="0"/>
+              <a:rPr lang="en-US"/>
               <a:t>Click to edit Master text styles</a:t>
             </a:r>
           </a:p>
@@ -2227,7 +2233,7 @@
               <a:pPr/>
               <a:t>6/7/2023</a:t>
             </a:fld>
-            <a:endParaRPr lang="en-US" dirty="0"/>
+            <a:endParaRPr lang="en-US"/>
           </a:p>
         </p:txBody>
       </p:sp>
@@ -2246,7 +2252,7 @@
           <a:bodyPr/>
           <a:lstStyle/>
           <a:p>
-            <a:endParaRPr lang="en-US" dirty="0"/>
+            <a:endParaRPr lang="en-US"/>
           </a:p>
         </p:txBody>
       </p:sp>
@@ -2270,7 +2276,7 @@
               <a:pPr/>
               <a:t>‹#›</a:t>
             </a:fld>
-            <a:endParaRPr lang="en-US" dirty="0"/>
+            <a:endParaRPr lang="en-US"/>
           </a:p>
         </p:txBody>
       </p:sp>
@@ -2409,7 +2415,7 @@
           <a:p>
             <a:pPr lvl="0"/>
             <a:r>
-              <a:rPr lang="en-US" sz="8000" dirty="0">
+              <a:rPr lang="en-US" sz="8000">
                 <a:solidFill>
                   <a:schemeClr val="tx1"/>
                 </a:solidFill>
@@ -2525,7 +2531,7 @@
           <a:p>
             <a:pPr lvl="0" algn="r"/>
             <a:r>
-              <a:rPr lang="en-US" sz="8000" dirty="0">
+              <a:rPr lang="en-US" sz="8000">
                 <a:solidFill>
                   <a:schemeClr val="tx1"/>
                 </a:solidFill>
@@ -2567,7 +2573,7 @@
           </a:lstStyle>
           <a:p>
             <a:r>
-              <a:rPr lang="en-US" dirty="0"/>
+              <a:rPr lang="en-US"/>
               <a:t>Click to edit Master title style</a:t>
             </a:r>
           </a:p>
@@ -2623,7 +2629,7 @@
           <a:p>
             <a:pPr lvl="0"/>
             <a:r>
-              <a:rPr lang="en-US" dirty="0"/>
+              <a:rPr lang="en-US"/>
               <a:t>Click to edit Master text styles</a:t>
             </a:r>
           </a:p>
@@ -2742,7 +2748,7 @@
           <a:p>
             <a:pPr lvl="0"/>
             <a:r>
-              <a:rPr lang="en-US" dirty="0"/>
+              <a:rPr lang="en-US"/>
               <a:t>Click to edit Master text styles</a:t>
             </a:r>
           </a:p>
@@ -2768,7 +2774,7 @@
               <a:pPr/>
               <a:t>6/7/2023</a:t>
             </a:fld>
-            <a:endParaRPr lang="en-US" dirty="0"/>
+            <a:endParaRPr lang="en-US"/>
           </a:p>
         </p:txBody>
       </p:sp>
@@ -2787,7 +2793,7 @@
           <a:bodyPr/>
           <a:lstStyle/>
           <a:p>
-            <a:endParaRPr lang="en-US" dirty="0"/>
+            <a:endParaRPr lang="en-US"/>
           </a:p>
         </p:txBody>
       </p:sp>
@@ -2811,7 +2817,7 @@
               <a:pPr/>
               <a:t>‹#›</a:t>
             </a:fld>
-            <a:endParaRPr lang="en-US" dirty="0"/>
+            <a:endParaRPr lang="en-US"/>
           </a:p>
         </p:txBody>
       </p:sp>
@@ -2872,7 +2878,7 @@
           </a:lstStyle>
           <a:p>
             <a:r>
-              <a:rPr lang="en-US" dirty="0"/>
+              <a:rPr lang="en-US"/>
               <a:t>Click to edit Master title style</a:t>
             </a:r>
           </a:p>
@@ -2991,7 +2997,7 @@
           <a:p>
             <a:pPr lvl="0"/>
             <a:r>
-              <a:rPr lang="en-US" dirty="0"/>
+              <a:rPr lang="en-US"/>
               <a:t>Click to edit Master text styles</a:t>
             </a:r>
           </a:p>
@@ -3017,7 +3023,7 @@
               <a:pPr/>
               <a:t>6/7/2023</a:t>
             </a:fld>
-            <a:endParaRPr lang="en-US" dirty="0"/>
+            <a:endParaRPr lang="en-US"/>
           </a:p>
         </p:txBody>
       </p:sp>
@@ -3036,7 +3042,7 @@
           <a:bodyPr/>
           <a:lstStyle/>
           <a:p>
-            <a:endParaRPr lang="en-US" dirty="0"/>
+            <a:endParaRPr lang="en-US"/>
           </a:p>
         </p:txBody>
       </p:sp>
@@ -3060,7 +3066,7 @@
               <a:pPr/>
               <a:t>‹#›</a:t>
             </a:fld>
-            <a:endParaRPr lang="en-US" dirty="0"/>
+            <a:endParaRPr lang="en-US"/>
           </a:p>
         </p:txBody>
       </p:sp>
@@ -3199,7 +3205,7 @@
           <a:p>
             <a:pPr lvl="0"/>
             <a:r>
-              <a:rPr lang="en-US" sz="8000" dirty="0">
+              <a:rPr lang="en-US" sz="8000">
                 <a:solidFill>
                   <a:schemeClr val="tx1"/>
                 </a:solidFill>
@@ -3315,7 +3321,7 @@
           <a:p>
             <a:pPr lvl="0" algn="r"/>
             <a:r>
-              <a:rPr lang="en-US" sz="8000" dirty="0">
+              <a:rPr lang="en-US" sz="8000">
                 <a:solidFill>
                   <a:schemeClr val="tx1"/>
                 </a:solidFill>
@@ -3357,7 +3363,7 @@
           </a:lstStyle>
           <a:p>
             <a:r>
-              <a:rPr lang="en-US" dirty="0"/>
+              <a:rPr lang="en-US"/>
               <a:t>Click to edit Master title style</a:t>
             </a:r>
           </a:p>
@@ -3405,7 +3411,7 @@
               <a:buNone/>
             </a:pPr>
             <a:r>
-              <a:rPr lang="en-US" dirty="0"/>
+              <a:rPr lang="en-US"/>
               <a:t>Click to edit Master text styles</a:t>
             </a:r>
           </a:p>
@@ -3524,7 +3530,7 @@
           <a:p>
             <a:pPr lvl="0"/>
             <a:r>
-              <a:rPr lang="en-US" dirty="0"/>
+              <a:rPr lang="en-US"/>
               <a:t>Click to edit Master text styles</a:t>
             </a:r>
           </a:p>
@@ -3550,7 +3556,7 @@
               <a:pPr/>
               <a:t>6/7/2023</a:t>
             </a:fld>
-            <a:endParaRPr lang="en-US" dirty="0"/>
+            <a:endParaRPr lang="en-US"/>
           </a:p>
         </p:txBody>
       </p:sp>
@@ -3569,7 +3575,7 @@
           <a:bodyPr/>
           <a:lstStyle/>
           <a:p>
-            <a:endParaRPr lang="en-US" dirty="0"/>
+            <a:endParaRPr lang="en-US"/>
           </a:p>
         </p:txBody>
       </p:sp>
@@ -3593,7 +3599,7 @@
               <a:pPr/>
               <a:t>‹#›</a:t>
             </a:fld>
-            <a:endParaRPr lang="en-US" dirty="0"/>
+            <a:endParaRPr lang="en-US"/>
           </a:p>
         </p:txBody>
       </p:sp>
@@ -3655,7 +3661,7 @@
           <a:p>
             <a:pPr marL="0" lvl="0"/>
             <a:r>
-              <a:rPr lang="en-US" dirty="0"/>
+              <a:rPr lang="en-US"/>
               <a:t>Click to edit Master title style</a:t>
             </a:r>
           </a:p>
@@ -3703,7 +3709,7 @@
               <a:buNone/>
             </a:pPr>
             <a:r>
-              <a:rPr lang="en-US" dirty="0"/>
+              <a:rPr lang="en-US"/>
               <a:t>Click to edit Master text styles</a:t>
             </a:r>
           </a:p>
@@ -3822,7 +3828,7 @@
           <a:p>
             <a:pPr lvl="0"/>
             <a:r>
-              <a:rPr lang="en-US" dirty="0"/>
+              <a:rPr lang="en-US"/>
               <a:t>Click to edit Master text styles</a:t>
             </a:r>
           </a:p>
@@ -3848,7 +3854,7 @@
               <a:pPr/>
               <a:t>6/7/2023</a:t>
             </a:fld>
-            <a:endParaRPr lang="en-US" dirty="0"/>
+            <a:endParaRPr lang="en-US"/>
           </a:p>
         </p:txBody>
       </p:sp>
@@ -3867,7 +3873,7 @@
           <a:bodyPr/>
           <a:lstStyle/>
           <a:p>
-            <a:endParaRPr lang="en-US" dirty="0"/>
+            <a:endParaRPr lang="en-US"/>
           </a:p>
         </p:txBody>
       </p:sp>
@@ -3891,7 +3897,7 @@
               <a:pPr/>
               <a:t>‹#›</a:t>
             </a:fld>
-            <a:endParaRPr lang="en-US" dirty="0"/>
+            <a:endParaRPr lang="en-US"/>
           </a:p>
         </p:txBody>
       </p:sp>
@@ -3945,7 +3951,7 @@
           </a:lstStyle>
           <a:p>
             <a:r>
-              <a:rPr lang="en-US" dirty="0"/>
+              <a:rPr lang="en-US"/>
               <a:t>Click to edit Master title style</a:t>
             </a:r>
           </a:p>
@@ -3968,35 +3974,35 @@
           <a:p>
             <a:pPr lvl="0"/>
             <a:r>
-              <a:rPr lang="en-US" dirty="0"/>
+              <a:rPr lang="en-US"/>
               <a:t>Click to edit Master text styles</a:t>
             </a:r>
           </a:p>
           <a:p>
             <a:pPr lvl="1"/>
             <a:r>
-              <a:rPr lang="en-US" dirty="0"/>
+              <a:rPr lang="en-US"/>
               <a:t>Second level</a:t>
             </a:r>
           </a:p>
           <a:p>
             <a:pPr lvl="2"/>
             <a:r>
-              <a:rPr lang="en-US" dirty="0"/>
+              <a:rPr lang="en-US"/>
               <a:t>Third level</a:t>
             </a:r>
           </a:p>
           <a:p>
             <a:pPr lvl="3"/>
             <a:r>
-              <a:rPr lang="en-US" dirty="0"/>
+              <a:rPr lang="en-US"/>
               <a:t>Fourth level</a:t>
             </a:r>
           </a:p>
           <a:p>
             <a:pPr lvl="4"/>
             <a:r>
-              <a:rPr lang="en-US" dirty="0"/>
+              <a:rPr lang="en-US"/>
               <a:t>Fifth level</a:t>
             </a:r>
           </a:p>
@@ -4022,7 +4028,7 @@
               <a:pPr/>
               <a:t>6/7/2023</a:t>
             </a:fld>
-            <a:endParaRPr lang="en-US" dirty="0"/>
+            <a:endParaRPr lang="en-US"/>
           </a:p>
         </p:txBody>
       </p:sp>
@@ -4041,7 +4047,7 @@
           <a:bodyPr/>
           <a:lstStyle/>
           <a:p>
-            <a:endParaRPr lang="en-US" dirty="0"/>
+            <a:endParaRPr lang="en-US"/>
           </a:p>
         </p:txBody>
       </p:sp>
@@ -4065,7 +4071,7 @@
               <a:pPr/>
               <a:t>‹#›</a:t>
             </a:fld>
-            <a:endParaRPr lang="en-US" dirty="0"/>
+            <a:endParaRPr lang="en-US"/>
           </a:p>
         </p:txBody>
       </p:sp>
@@ -4120,7 +4126,7 @@
           <a:lstStyle/>
           <a:p>
             <a:r>
-              <a:rPr lang="en-US" dirty="0"/>
+              <a:rPr lang="en-US"/>
               <a:t>Click to edit Master title style</a:t>
             </a:r>
           </a:p>
@@ -4148,35 +4154,35 @@
           <a:p>
             <a:pPr lvl="0"/>
             <a:r>
-              <a:rPr lang="en-US" dirty="0"/>
+              <a:rPr lang="en-US"/>
               <a:t>Click to edit Master text styles</a:t>
             </a:r>
           </a:p>
           <a:p>
             <a:pPr lvl="1"/>
             <a:r>
-              <a:rPr lang="en-US" dirty="0"/>
+              <a:rPr lang="en-US"/>
               <a:t>Second level</a:t>
             </a:r>
           </a:p>
           <a:p>
             <a:pPr lvl="2"/>
             <a:r>
-              <a:rPr lang="en-US" dirty="0"/>
+              <a:rPr lang="en-US"/>
               <a:t>Third level</a:t>
             </a:r>
           </a:p>
           <a:p>
             <a:pPr lvl="3"/>
             <a:r>
-              <a:rPr lang="en-US" dirty="0"/>
+              <a:rPr lang="en-US"/>
               <a:t>Fourth level</a:t>
             </a:r>
           </a:p>
           <a:p>
             <a:pPr lvl="4"/>
             <a:r>
-              <a:rPr lang="en-US" dirty="0"/>
+              <a:rPr lang="en-US"/>
               <a:t>Fifth level</a:t>
             </a:r>
           </a:p>
@@ -4202,7 +4208,7 @@
               <a:pPr/>
               <a:t>6/7/2023</a:t>
             </a:fld>
-            <a:endParaRPr lang="en-US" dirty="0"/>
+            <a:endParaRPr lang="en-US"/>
           </a:p>
         </p:txBody>
       </p:sp>
@@ -4221,7 +4227,7 @@
           <a:bodyPr/>
           <a:lstStyle/>
           <a:p>
-            <a:endParaRPr lang="en-US" dirty="0"/>
+            <a:endParaRPr lang="en-US"/>
           </a:p>
         </p:txBody>
       </p:sp>
@@ -4245,7 +4251,7 @@
               <a:pPr/>
               <a:t>‹#›</a:t>
             </a:fld>
-            <a:endParaRPr lang="en-US" dirty="0"/>
+            <a:endParaRPr lang="en-US"/>
           </a:p>
         </p:txBody>
       </p:sp>
@@ -4295,7 +4301,7 @@
           <a:lstStyle/>
           <a:p>
             <a:r>
-              <a:rPr lang="en-US" dirty="0"/>
+              <a:rPr lang="en-US"/>
               <a:t>Click to edit Master title style</a:t>
             </a:r>
           </a:p>
@@ -4318,35 +4324,35 @@
           <a:p>
             <a:pPr lvl="0"/>
             <a:r>
-              <a:rPr lang="en-US" dirty="0"/>
+              <a:rPr lang="en-US"/>
               <a:t>Click to edit Master text styles</a:t>
             </a:r>
           </a:p>
           <a:p>
             <a:pPr lvl="1"/>
             <a:r>
-              <a:rPr lang="en-US" dirty="0"/>
+              <a:rPr lang="en-US"/>
               <a:t>Second level</a:t>
             </a:r>
           </a:p>
           <a:p>
             <a:pPr lvl="2"/>
             <a:r>
-              <a:rPr lang="en-US" dirty="0"/>
+              <a:rPr lang="en-US"/>
               <a:t>Third level</a:t>
             </a:r>
           </a:p>
           <a:p>
             <a:pPr lvl="3"/>
             <a:r>
-              <a:rPr lang="en-US" dirty="0"/>
+              <a:rPr lang="en-US"/>
               <a:t>Fourth level</a:t>
             </a:r>
           </a:p>
           <a:p>
             <a:pPr lvl="4"/>
             <a:r>
-              <a:rPr lang="en-US" dirty="0"/>
+              <a:rPr lang="en-US"/>
               <a:t>Fifth level</a:t>
             </a:r>
           </a:p>
@@ -4372,7 +4378,7 @@
               <a:pPr/>
               <a:t>6/7/2023</a:t>
             </a:fld>
-            <a:endParaRPr lang="en-US" dirty="0"/>
+            <a:endParaRPr lang="en-US"/>
           </a:p>
         </p:txBody>
       </p:sp>
@@ -4391,7 +4397,7 @@
           <a:bodyPr/>
           <a:lstStyle/>
           <a:p>
-            <a:endParaRPr lang="en-US" dirty="0"/>
+            <a:endParaRPr lang="en-US"/>
           </a:p>
         </p:txBody>
       </p:sp>
@@ -4420,7 +4426,7 @@
               <a:pPr/>
               <a:t>‹#›</a:t>
             </a:fld>
-            <a:endParaRPr lang="en-US" dirty="0"/>
+            <a:endParaRPr lang="en-US"/>
           </a:p>
         </p:txBody>
       </p:sp>
@@ -4479,7 +4485,7 @@
           </a:lstStyle>
           <a:p>
             <a:r>
-              <a:rPr lang="en-US" dirty="0"/>
+              <a:rPr lang="en-US"/>
               <a:t>Click to edit Master title style</a:t>
             </a:r>
           </a:p>
@@ -4598,7 +4604,7 @@
           <a:p>
             <a:pPr lvl="0"/>
             <a:r>
-              <a:rPr lang="en-US" dirty="0"/>
+              <a:rPr lang="en-US"/>
               <a:t>Click to edit Master text styles</a:t>
             </a:r>
           </a:p>
@@ -4624,7 +4630,7 @@
               <a:pPr/>
               <a:t>6/7/2023</a:t>
             </a:fld>
-            <a:endParaRPr lang="en-US" dirty="0"/>
+            <a:endParaRPr lang="en-US"/>
           </a:p>
         </p:txBody>
       </p:sp>
@@ -4643,7 +4649,7 @@
           <a:bodyPr/>
           <a:lstStyle/>
           <a:p>
-            <a:endParaRPr lang="en-US" dirty="0"/>
+            <a:endParaRPr lang="en-US"/>
           </a:p>
         </p:txBody>
       </p:sp>
@@ -4667,7 +4673,7 @@
               <a:pPr/>
               <a:t>‹#›</a:t>
             </a:fld>
-            <a:endParaRPr lang="en-US" dirty="0"/>
+            <a:endParaRPr lang="en-US"/>
           </a:p>
         </p:txBody>
       </p:sp>
@@ -4722,7 +4728,7 @@
           <a:lstStyle/>
           <a:p>
             <a:r>
-              <a:rPr lang="en-US" dirty="0"/>
+              <a:rPr lang="en-US"/>
               <a:t>Click to edit Master title style</a:t>
             </a:r>
           </a:p>
@@ -4780,35 +4786,35 @@
           <a:p>
             <a:pPr lvl="0"/>
             <a:r>
-              <a:rPr lang="en-US" dirty="0"/>
+              <a:rPr lang="en-US"/>
               <a:t>Click to edit Master text styles</a:t>
             </a:r>
           </a:p>
           <a:p>
             <a:pPr lvl="1"/>
             <a:r>
-              <a:rPr lang="en-US" dirty="0"/>
+              <a:rPr lang="en-US"/>
               <a:t>Second level</a:t>
             </a:r>
           </a:p>
           <a:p>
             <a:pPr lvl="2"/>
             <a:r>
-              <a:rPr lang="en-US" dirty="0"/>
+              <a:rPr lang="en-US"/>
               <a:t>Third level</a:t>
             </a:r>
           </a:p>
           <a:p>
             <a:pPr lvl="3"/>
             <a:r>
-              <a:rPr lang="en-US" dirty="0"/>
+              <a:rPr lang="en-US"/>
               <a:t>Fourth level</a:t>
             </a:r>
           </a:p>
           <a:p>
             <a:pPr lvl="4"/>
             <a:r>
-              <a:rPr lang="en-US" dirty="0"/>
+              <a:rPr lang="en-US"/>
               <a:t>Fifth level</a:t>
             </a:r>
           </a:p>
@@ -4866,35 +4872,35 @@
           <a:p>
             <a:pPr lvl="0"/>
             <a:r>
-              <a:rPr lang="en-US" dirty="0"/>
+              <a:rPr lang="en-US"/>
               <a:t>Click to edit Master text styles</a:t>
             </a:r>
           </a:p>
           <a:p>
             <a:pPr lvl="1"/>
             <a:r>
-              <a:rPr lang="en-US" dirty="0"/>
+              <a:rPr lang="en-US"/>
               <a:t>Second level</a:t>
             </a:r>
           </a:p>
           <a:p>
             <a:pPr lvl="2"/>
             <a:r>
-              <a:rPr lang="en-US" dirty="0"/>
+              <a:rPr lang="en-US"/>
               <a:t>Third level</a:t>
             </a:r>
           </a:p>
           <a:p>
             <a:pPr lvl="3"/>
             <a:r>
-              <a:rPr lang="en-US" dirty="0"/>
+              <a:rPr lang="en-US"/>
               <a:t>Fourth level</a:t>
             </a:r>
           </a:p>
           <a:p>
             <a:pPr lvl="4"/>
             <a:r>
-              <a:rPr lang="en-US" dirty="0"/>
+              <a:rPr lang="en-US"/>
               <a:t>Fifth level</a:t>
             </a:r>
           </a:p>
@@ -4920,7 +4926,7 @@
               <a:pPr/>
               <a:t>6/7/2023</a:t>
             </a:fld>
-            <a:endParaRPr lang="en-US" dirty="0"/>
+            <a:endParaRPr lang="en-US"/>
           </a:p>
         </p:txBody>
       </p:sp>
@@ -4939,7 +4945,7 @@
           <a:bodyPr/>
           <a:lstStyle/>
           <a:p>
-            <a:endParaRPr lang="en-US" dirty="0"/>
+            <a:endParaRPr lang="en-US"/>
           </a:p>
         </p:txBody>
       </p:sp>
@@ -4963,7 +4969,7 @@
               <a:pPr/>
               <a:t>‹#›</a:t>
             </a:fld>
-            <a:endParaRPr lang="en-US" dirty="0"/>
+            <a:endParaRPr lang="en-US"/>
           </a:p>
         </p:txBody>
       </p:sp>
@@ -5017,7 +5023,7 @@
           </a:lstStyle>
           <a:p>
             <a:r>
-              <a:rPr lang="en-US" dirty="0"/>
+              <a:rPr lang="en-US"/>
               <a:t>Click to edit Master title style</a:t>
             </a:r>
           </a:p>
@@ -5090,7 +5096,7 @@
           <a:p>
             <a:pPr lvl="0"/>
             <a:r>
-              <a:rPr lang="en-US" dirty="0"/>
+              <a:rPr lang="en-US"/>
               <a:t>Click to edit Master text styles</a:t>
             </a:r>
           </a:p>
@@ -5148,35 +5154,35 @@
           <a:p>
             <a:pPr lvl="0"/>
             <a:r>
-              <a:rPr lang="en-US" dirty="0"/>
+              <a:rPr lang="en-US"/>
               <a:t>Click to edit Master text styles</a:t>
             </a:r>
           </a:p>
           <a:p>
             <a:pPr lvl="1"/>
             <a:r>
-              <a:rPr lang="en-US" dirty="0"/>
+              <a:rPr lang="en-US"/>
               <a:t>Second level</a:t>
             </a:r>
           </a:p>
           <a:p>
             <a:pPr lvl="2"/>
             <a:r>
-              <a:rPr lang="en-US" dirty="0"/>
+              <a:rPr lang="en-US"/>
               <a:t>Third level</a:t>
             </a:r>
           </a:p>
           <a:p>
             <a:pPr lvl="3"/>
             <a:r>
-              <a:rPr lang="en-US" dirty="0"/>
+              <a:rPr lang="en-US"/>
               <a:t>Fourth level</a:t>
             </a:r>
           </a:p>
           <a:p>
             <a:pPr lvl="4"/>
             <a:r>
-              <a:rPr lang="en-US" dirty="0"/>
+              <a:rPr lang="en-US"/>
               <a:t>Fifth level</a:t>
             </a:r>
           </a:p>
@@ -5249,7 +5255,7 @@
           <a:p>
             <a:pPr lvl="0"/>
             <a:r>
-              <a:rPr lang="en-US" dirty="0"/>
+              <a:rPr lang="en-US"/>
               <a:t>Click to edit Master text styles</a:t>
             </a:r>
           </a:p>
@@ -5307,35 +5313,35 @@
           <a:p>
             <a:pPr lvl="0"/>
             <a:r>
-              <a:rPr lang="en-US" dirty="0"/>
+              <a:rPr lang="en-US"/>
               <a:t>Click to edit Master text styles</a:t>
             </a:r>
           </a:p>
           <a:p>
             <a:pPr lvl="1"/>
             <a:r>
-              <a:rPr lang="en-US" dirty="0"/>
+              <a:rPr lang="en-US"/>
               <a:t>Second level</a:t>
             </a:r>
           </a:p>
           <a:p>
             <a:pPr lvl="2"/>
             <a:r>
-              <a:rPr lang="en-US" dirty="0"/>
+              <a:rPr lang="en-US"/>
               <a:t>Third level</a:t>
             </a:r>
           </a:p>
           <a:p>
             <a:pPr lvl="3"/>
             <a:r>
-              <a:rPr lang="en-US" dirty="0"/>
+              <a:rPr lang="en-US"/>
               <a:t>Fourth level</a:t>
             </a:r>
           </a:p>
           <a:p>
             <a:pPr lvl="4"/>
             <a:r>
-              <a:rPr lang="en-US" dirty="0"/>
+              <a:rPr lang="en-US"/>
               <a:t>Fifth level</a:t>
             </a:r>
           </a:p>
@@ -5361,7 +5367,7 @@
               <a:pPr/>
               <a:t>6/7/2023</a:t>
             </a:fld>
-            <a:endParaRPr lang="en-US" dirty="0"/>
+            <a:endParaRPr lang="en-US"/>
           </a:p>
         </p:txBody>
       </p:sp>
@@ -5380,7 +5386,7 @@
           <a:bodyPr/>
           <a:lstStyle/>
           <a:p>
-            <a:endParaRPr lang="en-US" dirty="0"/>
+            <a:endParaRPr lang="en-US"/>
           </a:p>
         </p:txBody>
       </p:sp>
@@ -5404,7 +5410,7 @@
               <a:pPr/>
               <a:t>‹#›</a:t>
             </a:fld>
-            <a:endParaRPr lang="en-US" dirty="0"/>
+            <a:endParaRPr lang="en-US"/>
           </a:p>
         </p:txBody>
       </p:sp>
@@ -5454,7 +5460,7 @@
           <a:lstStyle/>
           <a:p>
             <a:r>
-              <a:rPr lang="en-US" dirty="0"/>
+              <a:rPr lang="en-US"/>
               <a:t>Click to edit Master title style</a:t>
             </a:r>
           </a:p>
@@ -5480,7 +5486,7 @@
               <a:pPr/>
               <a:t>6/7/2023</a:t>
             </a:fld>
-            <a:endParaRPr lang="en-US" dirty="0"/>
+            <a:endParaRPr lang="en-US"/>
           </a:p>
         </p:txBody>
       </p:sp>
@@ -5499,7 +5505,7 @@
           <a:bodyPr/>
           <a:lstStyle/>
           <a:p>
-            <a:endParaRPr lang="en-US" dirty="0"/>
+            <a:endParaRPr lang="en-US"/>
           </a:p>
         </p:txBody>
       </p:sp>
@@ -5523,7 +5529,7 @@
               <a:pPr/>
               <a:t>‹#›</a:t>
             </a:fld>
-            <a:endParaRPr lang="en-US" dirty="0"/>
+            <a:endParaRPr lang="en-US"/>
           </a:p>
         </p:txBody>
       </p:sp>
@@ -5577,7 +5583,7 @@
               <a:pPr/>
               <a:t>6/7/2023</a:t>
             </a:fld>
-            <a:endParaRPr lang="en-US" dirty="0"/>
+            <a:endParaRPr lang="en-US"/>
           </a:p>
         </p:txBody>
       </p:sp>
@@ -5596,7 +5602,7 @@
           <a:bodyPr/>
           <a:lstStyle/>
           <a:p>
-            <a:endParaRPr lang="en-US" dirty="0"/>
+            <a:endParaRPr lang="en-US"/>
           </a:p>
         </p:txBody>
       </p:sp>
@@ -5620,7 +5626,7 @@
               <a:pPr/>
               <a:t>‹#›</a:t>
             </a:fld>
-            <a:endParaRPr lang="en-US" dirty="0"/>
+            <a:endParaRPr lang="en-US"/>
           </a:p>
         </p:txBody>
       </p:sp>
@@ -5681,7 +5687,7 @@
           </a:lstStyle>
           <a:p>
             <a:r>
-              <a:rPr lang="en-US" dirty="0"/>
+              <a:rPr lang="en-US"/>
               <a:t>Click to edit Master title style</a:t>
             </a:r>
           </a:p>
@@ -5739,35 +5745,35 @@
           <a:p>
             <a:pPr lvl="0"/>
             <a:r>
-              <a:rPr lang="en-US" dirty="0"/>
+              <a:rPr lang="en-US"/>
               <a:t>Click to edit Master text styles</a:t>
             </a:r>
           </a:p>
           <a:p>
             <a:pPr lvl="1"/>
             <a:r>
-              <a:rPr lang="en-US" dirty="0"/>
+              <a:rPr lang="en-US"/>
               <a:t>Second level</a:t>
             </a:r>
           </a:p>
           <a:p>
             <a:pPr lvl="2"/>
             <a:r>
-              <a:rPr lang="en-US" dirty="0"/>
+              <a:rPr lang="en-US"/>
               <a:t>Third level</a:t>
             </a:r>
           </a:p>
           <a:p>
             <a:pPr lvl="3"/>
             <a:r>
-              <a:rPr lang="en-US" dirty="0"/>
+              <a:rPr lang="en-US"/>
               <a:t>Fourth level</a:t>
             </a:r>
           </a:p>
           <a:p>
             <a:pPr lvl="4"/>
             <a:r>
-              <a:rPr lang="en-US" dirty="0"/>
+              <a:rPr lang="en-US"/>
               <a:t>Fifth level</a:t>
             </a:r>
           </a:p>
@@ -5834,7 +5840,7 @@
           <a:p>
             <a:pPr lvl="0"/>
             <a:r>
-              <a:rPr lang="en-US" dirty="0"/>
+              <a:rPr lang="en-US"/>
               <a:t>Click to edit Master text styles</a:t>
             </a:r>
           </a:p>
@@ -5860,7 +5866,7 @@
               <a:pPr/>
               <a:t>6/7/2023</a:t>
             </a:fld>
-            <a:endParaRPr lang="en-US" dirty="0"/>
+            <a:endParaRPr lang="en-US"/>
           </a:p>
         </p:txBody>
       </p:sp>
@@ -5879,7 +5885,7 @@
           <a:bodyPr/>
           <a:lstStyle/>
           <a:p>
-            <a:endParaRPr lang="en-US" dirty="0"/>
+            <a:endParaRPr lang="en-US"/>
           </a:p>
         </p:txBody>
       </p:sp>
@@ -5903,7 +5909,7 @@
               <a:pPr/>
               <a:t>‹#›</a:t>
             </a:fld>
-            <a:endParaRPr lang="en-US" dirty="0"/>
+            <a:endParaRPr lang="en-US"/>
           </a:p>
         </p:txBody>
       </p:sp>
@@ -5964,7 +5970,7 @@
           </a:lstStyle>
           <a:p>
             <a:r>
-              <a:rPr lang="en-US" dirty="0"/>
+              <a:rPr lang="en-US"/>
               <a:t>Click to edit Master title style</a:t>
             </a:r>
           </a:p>
@@ -6057,7 +6063,7 @@
             </a:lvl9pPr>
           </a:lstStyle>
           <a:p>
-            <a:endParaRPr lang="en-US" dirty="0"/>
+            <a:endParaRPr lang="en-US"/>
           </a:p>
         </p:txBody>
       </p:sp>
@@ -6122,7 +6128,7 @@
           <a:p>
             <a:pPr lvl="0"/>
             <a:r>
-              <a:rPr lang="en-US" dirty="0"/>
+              <a:rPr lang="en-US"/>
               <a:t>Click to edit Master text styles</a:t>
             </a:r>
           </a:p>
@@ -6148,7 +6154,7 @@
               <a:pPr/>
               <a:t>6/7/2023</a:t>
             </a:fld>
-            <a:endParaRPr lang="en-US" dirty="0"/>
+            <a:endParaRPr lang="en-US"/>
           </a:p>
         </p:txBody>
       </p:sp>
@@ -6167,7 +6173,7 @@
           <a:bodyPr/>
           <a:lstStyle/>
           <a:p>
-            <a:endParaRPr lang="en-US" dirty="0"/>
+            <a:endParaRPr lang="en-US"/>
           </a:p>
         </p:txBody>
       </p:sp>
@@ -6191,7 +6197,7 @@
               <a:pPr/>
               <a:t>‹#›</a:t>
             </a:fld>
-            <a:endParaRPr lang="en-US" dirty="0"/>
+            <a:endParaRPr lang="en-US"/>
           </a:p>
         </p:txBody>
       </p:sp>
@@ -6573,7 +6579,7 @@
           <a:lstStyle/>
           <a:p>
             <a:r>
-              <a:rPr lang="en-US" dirty="0"/>
+              <a:rPr lang="en-US"/>
               <a:t>Click to edit Master title style</a:t>
             </a:r>
           </a:p>
@@ -6606,35 +6612,35 @@
           <a:p>
             <a:pPr lvl="0"/>
             <a:r>
-              <a:rPr lang="en-US" dirty="0"/>
+              <a:rPr lang="en-US"/>
               <a:t>Click to edit Master text styles</a:t>
             </a:r>
           </a:p>
           <a:p>
             <a:pPr lvl="1"/>
             <a:r>
-              <a:rPr lang="en-US" dirty="0"/>
+              <a:rPr lang="en-US"/>
               <a:t>Second level</a:t>
             </a:r>
           </a:p>
           <a:p>
             <a:pPr lvl="2"/>
             <a:r>
-              <a:rPr lang="en-US" dirty="0"/>
+              <a:rPr lang="en-US"/>
               <a:t>Third level</a:t>
             </a:r>
           </a:p>
           <a:p>
             <a:pPr lvl="3"/>
             <a:r>
-              <a:rPr lang="en-US" dirty="0"/>
+              <a:rPr lang="en-US"/>
               <a:t>Fourth level</a:t>
             </a:r>
           </a:p>
           <a:p>
             <a:pPr lvl="4"/>
             <a:r>
-              <a:rPr lang="en-US" dirty="0"/>
+              <a:rPr lang="en-US"/>
               <a:t>Fifth level</a:t>
             </a:r>
           </a:p>
@@ -6678,7 +6684,7 @@
               <a:pPr/>
               <a:t>6/7/2023</a:t>
             </a:fld>
-            <a:endParaRPr lang="en-US" dirty="0"/>
+            <a:endParaRPr lang="en-US"/>
           </a:p>
         </p:txBody>
       </p:sp>
@@ -6715,7 +6721,7 @@
             </a:lvl1pPr>
           </a:lstStyle>
           <a:p>
-            <a:endParaRPr lang="en-US" dirty="0"/>
+            <a:endParaRPr lang="en-US"/>
           </a:p>
         </p:txBody>
       </p:sp>
@@ -6757,7 +6763,7 @@
               <a:pPr/>
               <a:t>‹#›</a:t>
             </a:fld>
-            <a:endParaRPr lang="en-US" dirty="0"/>
+            <a:endParaRPr lang="en-US"/>
           </a:p>
         </p:txBody>
       </p:sp>
@@ -7241,13 +7247,13 @@
           <a:p>
             <a:pPr algn="l"/>
             <a:br>
-              <a:rPr lang="en-US" sz="3200" dirty="0"/>
+              <a:rPr lang="en-US" sz="3200"/>
             </a:br>
             <a:br>
-              <a:rPr lang="en-US" sz="3200" dirty="0"/>
+              <a:rPr lang="en-US" sz="3200"/>
             </a:br>
             <a:r>
-              <a:rPr lang="en-US" sz="4000" b="1" dirty="0"/>
+              <a:rPr lang="en-US" sz="4000" b="1"/>
               <a:t>F1_driver_standings_predictor</a:t>
             </a:r>
             <a:endParaRPr lang="en-US" sz="4000" b="1">
@@ -7501,7 +7507,7 @@
           <a:lstStyle/>
           <a:p>
             <a:r>
-              <a:rPr lang="hu-HU" sz="6000" b="1" dirty="0">
+              <a:rPr lang="hu-HU" sz="6000" b="1">
                 <a:cs typeface="Calibri Light"/>
               </a:rPr>
               <a:t>A feladat:</a:t>
@@ -7541,7 +7547,7 @@
               <a:buNone/>
             </a:pPr>
             <a:r>
-              <a:rPr lang="hu-HU" sz="4000" dirty="0">
+              <a:rPr lang="hu-HU" sz="4000">
                 <a:cs typeface="Calibri"/>
               </a:rPr>
               <a:t>Olyan modell készítése, ami "megjósolja" a F1 2023-as szezonjának világbajnoki tabella végeredményét.</a:t>
@@ -7565,27 +7571,6 @@
 <file path=ppt/slides/slide3.xml><?xml version="1.0" encoding="utf-8"?>
 <p:sld xmlns:a="http://schemas.openxmlformats.org/drawingml/2006/main" xmlns:r="http://schemas.openxmlformats.org/officeDocument/2006/relationships" xmlns:p="http://schemas.openxmlformats.org/presentationml/2006/main">
   <p:cSld>
-    <p:bg>
-      <p:bgPr>
-        <a:blipFill rotWithShape="1">
-          <a:blip r:embed="rId2">
-            <a:duotone>
-              <a:schemeClr val="bg2">
-                <a:shade val="76000"/>
-                <a:satMod val="180000"/>
-              </a:schemeClr>
-              <a:schemeClr val="bg2">
-                <a:tint val="80000"/>
-                <a:satMod val="120000"/>
-                <a:lumMod val="180000"/>
-              </a:schemeClr>
-            </a:duotone>
-          </a:blip>
-          <a:stretch/>
-        </a:blipFill>
-        <a:effectLst/>
-      </p:bgPr>
-    </p:bg>
     <p:spTree>
       <p:nvGrpSpPr>
         <p:cNvPr id="1" name=""/>
@@ -7600,749 +7585,6 @@
           <a:chExt cx="0" cy="0"/>
         </a:xfrm>
       </p:grpSpPr>
-      <p:sp useBgFill="1">
-        <p:nvSpPr>
-          <p:cNvPr id="9" name="Rectangle 8">
-            <a:extLst>
-              <a:ext uri="{FF2B5EF4-FFF2-40B4-BE49-F238E27FC236}">
-                <a16:creationId xmlns:a16="http://schemas.microsoft.com/office/drawing/2014/main" id="{6AD30037-67ED-4367-9BE0-45787510BF13}"/>
-              </a:ext>
-              <a:ext uri="{C183D7F6-B498-43B3-948B-1728B52AA6E4}">
-                <adec:decorative xmlns:adec="http://schemas.microsoft.com/office/drawing/2017/decorative" val="1"/>
-              </a:ext>
-            </a:extLst>
-          </p:cNvPr>
-          <p:cNvSpPr>
-            <a:spLocks noGrp="1" noRot="1" noChangeAspect="1" noMove="1" noResize="1" noEditPoints="1" noAdjustHandles="1" noChangeArrowheads="1" noChangeShapeType="1" noTextEdit="1"/>
-          </p:cNvSpPr>
-          <p:nvPr>
-            <p:extLst>
-              <p:ext uri="{386F3935-93C4-4BCD-93E2-E3B085C9AB24}">
-                <p16:designElem xmlns:p16="http://schemas.microsoft.com/office/powerpoint/2015/main" val="1"/>
-              </p:ext>
-            </p:extLst>
-          </p:nvPr>
-        </p:nvSpPr>
-        <p:spPr>
-          <a:xfrm>
-            <a:off x="0" y="0"/>
-            <a:ext cx="12192000" cy="6858000"/>
-          </a:xfrm>
-          <a:prstGeom prst="rect">
-            <a:avLst/>
-          </a:prstGeom>
-          <a:ln>
-            <a:noFill/>
-          </a:ln>
-        </p:spPr>
-        <p:style>
-          <a:lnRef idx="2">
-            <a:schemeClr val="accent1">
-              <a:shade val="50000"/>
-            </a:schemeClr>
-          </a:lnRef>
-          <a:fillRef idx="1">
-            <a:schemeClr val="accent1"/>
-          </a:fillRef>
-          <a:effectRef idx="0">
-            <a:schemeClr val="accent1"/>
-          </a:effectRef>
-          <a:fontRef idx="minor">
-            <a:schemeClr val="lt1"/>
-          </a:fontRef>
-        </p:style>
-        <p:txBody>
-          <a:bodyPr rtlCol="0" anchor="ctr"/>
-          <a:lstStyle/>
-          <a:p>
-            <a:pPr algn="ctr"/>
-            <a:endParaRPr lang="en-US"/>
-          </a:p>
-        </p:txBody>
-      </p:sp>
-      <p:pic>
-        <p:nvPicPr>
-          <p:cNvPr id="5" name="Picture 4" descr="Kérdőjel pasztellzöld háttérrel">
-            <a:extLst>
-              <a:ext uri="{FF2B5EF4-FFF2-40B4-BE49-F238E27FC236}">
-                <a16:creationId xmlns:a16="http://schemas.microsoft.com/office/drawing/2014/main" id="{B8D94D70-3EFE-FB5E-0510-B8EE14E5D069}"/>
-              </a:ext>
-            </a:extLst>
-          </p:cNvPr>
-          <p:cNvPicPr>
-            <a:picLocks noChangeAspect="1"/>
-          </p:cNvPicPr>
-          <p:nvPr/>
-        </p:nvPicPr>
-        <p:blipFill rotWithShape="1">
-          <a:blip r:embed="rId3"/>
-          <a:srcRect l="41204" r="847" b="4"/>
-          <a:stretch/>
-        </p:blipFill>
-        <p:spPr>
-          <a:xfrm>
-            <a:off x="6892924" y="10"/>
-            <a:ext cx="5299077" cy="6857990"/>
-          </a:xfrm>
-          <a:custGeom>
-            <a:avLst/>
-            <a:gdLst/>
-            <a:ahLst/>
-            <a:cxnLst/>
-            <a:rect l="l" t="t" r="r" b="b"/>
-            <a:pathLst>
-              <a:path w="5299077" h="6858000">
-                <a:moveTo>
-                  <a:pt x="836871" y="0"/>
-                </a:moveTo>
-                <a:lnTo>
-                  <a:pt x="5299077" y="0"/>
-                </a:lnTo>
-                <a:lnTo>
-                  <a:pt x="5299077" y="6858000"/>
-                </a:lnTo>
-                <a:lnTo>
-                  <a:pt x="1911312" y="6858000"/>
-                </a:lnTo>
-                <a:lnTo>
-                  <a:pt x="0" y="5333999"/>
-                </a:lnTo>
-                <a:close/>
-              </a:path>
-            </a:pathLst>
-          </a:custGeom>
-        </p:spPr>
-      </p:pic>
-      <p:grpSp>
-        <p:nvGrpSpPr>
-          <p:cNvPr id="11" name="Group 10">
-            <a:extLst>
-              <a:ext uri="{FF2B5EF4-FFF2-40B4-BE49-F238E27FC236}">
-                <a16:creationId xmlns:a16="http://schemas.microsoft.com/office/drawing/2014/main" id="{50841A4E-5BC1-44B4-83CF-D524E8AEAD64}"/>
-              </a:ext>
-              <a:ext uri="{C183D7F6-B498-43B3-948B-1728B52AA6E4}">
-                <adec:decorative xmlns:adec="http://schemas.microsoft.com/office/drawing/2017/decorative" val="1"/>
-              </a:ext>
-            </a:extLst>
-          </p:cNvPr>
-          <p:cNvGrpSpPr>
-            <a:grpSpLocks noGrp="1" noUngrp="1" noRot="1" noChangeAspect="1" noMove="1" noResize="1"/>
-          </p:cNvGrpSpPr>
-          <p:nvPr>
-            <p:extLst>
-              <p:ext uri="{386F3935-93C4-4BCD-93E2-E3B085C9AB24}">
-                <p16:designElem xmlns:p16="http://schemas.microsoft.com/office/powerpoint/2015/main" val="1"/>
-              </p:ext>
-            </p:extLst>
-          </p:nvPr>
-        </p:nvGrpSpPr>
-        <p:grpSpPr>
-          <a:xfrm>
-            <a:off x="6232760" y="0"/>
-            <a:ext cx="2436813" cy="6858001"/>
-            <a:chOff x="1320800" y="0"/>
-            <a:chExt cx="2436813" cy="6858001"/>
-          </a:xfrm>
-        </p:grpSpPr>
-        <p:sp>
-          <p:nvSpPr>
-            <p:cNvPr id="12" name="Freeform 6">
-              <a:extLst>
-                <a:ext uri="{FF2B5EF4-FFF2-40B4-BE49-F238E27FC236}">
-                  <a16:creationId xmlns:a16="http://schemas.microsoft.com/office/drawing/2014/main" id="{BF371BCC-8954-44E2-8C4F-29DC188727AC}"/>
-                </a:ext>
-                <a:ext uri="{C183D7F6-B498-43B3-948B-1728B52AA6E4}">
-                  <adec:decorative xmlns:adec="http://schemas.microsoft.com/office/drawing/2017/decorative" val="1"/>
-                </a:ext>
-              </a:extLst>
-            </p:cNvPr>
-            <p:cNvSpPr/>
-            <p:nvPr>
-              <p:extLst>
-                <p:ext uri="{386F3935-93C4-4BCD-93E2-E3B085C9AB24}">
-                  <p16:designElem xmlns:p16="http://schemas.microsoft.com/office/powerpoint/2015/main" val="1"/>
-                </p:ext>
-              </p:extLst>
-            </p:nvPr>
-          </p:nvSpPr>
-          <p:spPr bwMode="auto">
-            <a:xfrm>
-              <a:off x="1627188" y="0"/>
-              <a:ext cx="1122363" cy="5329238"/>
-            </a:xfrm>
-            <a:custGeom>
-              <a:avLst/>
-              <a:gdLst/>
-              <a:ahLst/>
-              <a:cxnLst/>
-              <a:rect l="0" t="0" r="r" b="b"/>
-              <a:pathLst>
-                <a:path w="707" h="3357">
-                  <a:moveTo>
-                    <a:pt x="0" y="3330"/>
-                  </a:moveTo>
-                  <a:lnTo>
-                    <a:pt x="156" y="3357"/>
-                  </a:lnTo>
-                  <a:lnTo>
-                    <a:pt x="707" y="0"/>
-                  </a:lnTo>
-                  <a:lnTo>
-                    <a:pt x="547" y="0"/>
-                  </a:lnTo>
-                  <a:lnTo>
-                    <a:pt x="0" y="3330"/>
-                  </a:lnTo>
-                  <a:close/>
-                </a:path>
-              </a:pathLst>
-            </a:custGeom>
-            <a:solidFill>
-              <a:schemeClr val="accent1"/>
-            </a:solidFill>
-            <a:ln>
-              <a:noFill/>
-            </a:ln>
-          </p:spPr>
-        </p:sp>
-        <p:sp>
-          <p:nvSpPr>
-            <p:cNvPr id="13" name="Freeform 7">
-              <a:extLst>
-                <a:ext uri="{FF2B5EF4-FFF2-40B4-BE49-F238E27FC236}">
-                  <a16:creationId xmlns:a16="http://schemas.microsoft.com/office/drawing/2014/main" id="{CD3505BE-B420-41C5-BE34-3E7652D37A5F}"/>
-                </a:ext>
-                <a:ext uri="{C183D7F6-B498-43B3-948B-1728B52AA6E4}">
-                  <adec:decorative xmlns:adec="http://schemas.microsoft.com/office/drawing/2017/decorative" val="1"/>
-                </a:ext>
-              </a:extLst>
-            </p:cNvPr>
-            <p:cNvSpPr/>
-            <p:nvPr>
-              <p:extLst>
-                <p:ext uri="{386F3935-93C4-4BCD-93E2-E3B085C9AB24}">
-                  <p16:designElem xmlns:p16="http://schemas.microsoft.com/office/powerpoint/2015/main" val="1"/>
-                </p:ext>
-              </p:extLst>
-            </p:nvPr>
-          </p:nvSpPr>
-          <p:spPr bwMode="auto">
-            <a:xfrm>
-              <a:off x="1320800" y="0"/>
-              <a:ext cx="1117600" cy="5276850"/>
-            </a:xfrm>
-            <a:custGeom>
-              <a:avLst/>
-              <a:gdLst/>
-              <a:ahLst/>
-              <a:cxnLst/>
-              <a:rect l="0" t="0" r="r" b="b"/>
-              <a:pathLst>
-                <a:path w="704" h="3324">
-                  <a:moveTo>
-                    <a:pt x="704" y="0"/>
-                  </a:moveTo>
-                  <a:lnTo>
-                    <a:pt x="545" y="0"/>
-                  </a:lnTo>
-                  <a:lnTo>
-                    <a:pt x="0" y="3300"/>
-                  </a:lnTo>
-                  <a:lnTo>
-                    <a:pt x="157" y="3324"/>
-                  </a:lnTo>
-                  <a:lnTo>
-                    <a:pt x="704" y="0"/>
-                  </a:lnTo>
-                  <a:close/>
-                </a:path>
-              </a:pathLst>
-            </a:custGeom>
-            <a:solidFill>
-              <a:schemeClr val="tx1">
-                <a:lumMod val="65000"/>
-                <a:lumOff val="35000"/>
-              </a:schemeClr>
-            </a:solidFill>
-            <a:ln>
-              <a:noFill/>
-            </a:ln>
-          </p:spPr>
-        </p:sp>
-        <p:sp>
-          <p:nvSpPr>
-            <p:cNvPr id="14" name="Freeform 8">
-              <a:extLst>
-                <a:ext uri="{FF2B5EF4-FFF2-40B4-BE49-F238E27FC236}">
-                  <a16:creationId xmlns:a16="http://schemas.microsoft.com/office/drawing/2014/main" id="{4B68A05B-A78B-4D59-8CF9-1900731A2188}"/>
-                </a:ext>
-                <a:ext uri="{C183D7F6-B498-43B3-948B-1728B52AA6E4}">
-                  <adec:decorative xmlns:adec="http://schemas.microsoft.com/office/drawing/2017/decorative" val="1"/>
-                </a:ext>
-              </a:extLst>
-            </p:cNvPr>
-            <p:cNvSpPr/>
-            <p:nvPr>
-              <p:extLst>
-                <p:ext uri="{386F3935-93C4-4BCD-93E2-E3B085C9AB24}">
-                  <p16:designElem xmlns:p16="http://schemas.microsoft.com/office/powerpoint/2015/main" val="1"/>
-                </p:ext>
-              </p:extLst>
-            </p:nvPr>
-          </p:nvSpPr>
-          <p:spPr bwMode="auto">
-            <a:xfrm>
-              <a:off x="1320800" y="5238750"/>
-              <a:ext cx="1228725" cy="1619250"/>
-            </a:xfrm>
-            <a:custGeom>
-              <a:avLst/>
-              <a:gdLst/>
-              <a:ahLst/>
-              <a:cxnLst/>
-              <a:rect l="0" t="0" r="r" b="b"/>
-              <a:pathLst>
-                <a:path w="774" h="1020">
-                  <a:moveTo>
-                    <a:pt x="0" y="0"/>
-                  </a:moveTo>
-                  <a:lnTo>
-                    <a:pt x="740" y="1020"/>
-                  </a:lnTo>
-                  <a:lnTo>
-                    <a:pt x="774" y="1020"/>
-                  </a:lnTo>
-                  <a:lnTo>
-                    <a:pt x="0" y="0"/>
-                  </a:lnTo>
-                  <a:close/>
-                </a:path>
-              </a:pathLst>
-            </a:custGeom>
-            <a:solidFill>
-              <a:schemeClr val="tx1">
-                <a:lumMod val="85000"/>
-                <a:lumOff val="15000"/>
-              </a:schemeClr>
-            </a:solidFill>
-            <a:ln>
-              <a:noFill/>
-            </a:ln>
-          </p:spPr>
-        </p:sp>
-        <p:sp>
-          <p:nvSpPr>
-            <p:cNvPr id="15" name="Freeform 9">
-              <a:extLst>
-                <a:ext uri="{FF2B5EF4-FFF2-40B4-BE49-F238E27FC236}">
-                  <a16:creationId xmlns:a16="http://schemas.microsoft.com/office/drawing/2014/main" id="{84D57A01-C112-4FF2-B5ED-0B762AAD9CE2}"/>
-                </a:ext>
-                <a:ext uri="{C183D7F6-B498-43B3-948B-1728B52AA6E4}">
-                  <adec:decorative xmlns:adec="http://schemas.microsoft.com/office/drawing/2017/decorative" val="1"/>
-                </a:ext>
-              </a:extLst>
-            </p:cNvPr>
-            <p:cNvSpPr/>
-            <p:nvPr>
-              <p:extLst>
-                <p:ext uri="{386F3935-93C4-4BCD-93E2-E3B085C9AB24}">
-                  <p16:designElem xmlns:p16="http://schemas.microsoft.com/office/powerpoint/2015/main" val="1"/>
-                </p:ext>
-              </p:extLst>
-            </p:nvPr>
-          </p:nvSpPr>
-          <p:spPr bwMode="auto">
-            <a:xfrm>
-              <a:off x="1627188" y="5291138"/>
-              <a:ext cx="1495425" cy="1566863"/>
-            </a:xfrm>
-            <a:custGeom>
-              <a:avLst/>
-              <a:gdLst/>
-              <a:ahLst/>
-              <a:cxnLst/>
-              <a:rect l="0" t="0" r="r" b="b"/>
-              <a:pathLst>
-                <a:path w="942" h="987">
-                  <a:moveTo>
-                    <a:pt x="0" y="0"/>
-                  </a:moveTo>
-                  <a:lnTo>
-                    <a:pt x="909" y="987"/>
-                  </a:lnTo>
-                  <a:lnTo>
-                    <a:pt x="942" y="987"/>
-                  </a:lnTo>
-                  <a:lnTo>
-                    <a:pt x="0" y="0"/>
-                  </a:lnTo>
-                  <a:close/>
-                </a:path>
-              </a:pathLst>
-            </a:custGeom>
-            <a:solidFill>
-              <a:schemeClr val="accent1">
-                <a:lumMod val="50000"/>
-              </a:schemeClr>
-            </a:solidFill>
-            <a:ln>
-              <a:noFill/>
-            </a:ln>
-          </p:spPr>
-        </p:sp>
-        <p:sp>
-          <p:nvSpPr>
-            <p:cNvPr id="16" name="Freeform 10">
-              <a:extLst>
-                <a:ext uri="{FF2B5EF4-FFF2-40B4-BE49-F238E27FC236}">
-                  <a16:creationId xmlns:a16="http://schemas.microsoft.com/office/drawing/2014/main" id="{6CCCCDF1-5D4F-4CA1-8400-DFBB96BB011D}"/>
-                </a:ext>
-                <a:ext uri="{C183D7F6-B498-43B3-948B-1728B52AA6E4}">
-                  <adec:decorative xmlns:adec="http://schemas.microsoft.com/office/drawing/2017/decorative" val="1"/>
-                </a:ext>
-              </a:extLst>
-            </p:cNvPr>
-            <p:cNvSpPr/>
-            <p:nvPr>
-              <p:extLst>
-                <p:ext uri="{386F3935-93C4-4BCD-93E2-E3B085C9AB24}">
-                  <p16:designElem xmlns:p16="http://schemas.microsoft.com/office/powerpoint/2015/main" val="1"/>
-                </p:ext>
-              </p:extLst>
-            </p:nvPr>
-          </p:nvSpPr>
-          <p:spPr bwMode="auto">
-            <a:xfrm>
-              <a:off x="1627188" y="5286375"/>
-              <a:ext cx="2130425" cy="1571625"/>
-            </a:xfrm>
-            <a:custGeom>
-              <a:avLst/>
-              <a:gdLst/>
-              <a:ahLst/>
-              <a:cxnLst/>
-              <a:rect l="0" t="0" r="r" b="b"/>
-              <a:pathLst>
-                <a:path w="1342" h="990">
-                  <a:moveTo>
-                    <a:pt x="0" y="3"/>
-                  </a:moveTo>
-                  <a:lnTo>
-                    <a:pt x="942" y="990"/>
-                  </a:lnTo>
-                  <a:lnTo>
-                    <a:pt x="1342" y="990"/>
-                  </a:lnTo>
-                  <a:lnTo>
-                    <a:pt x="156" y="27"/>
-                  </a:lnTo>
-                  <a:lnTo>
-                    <a:pt x="0" y="0"/>
-                  </a:lnTo>
-                  <a:lnTo>
-                    <a:pt x="0" y="3"/>
-                  </a:lnTo>
-                  <a:close/>
-                </a:path>
-              </a:pathLst>
-            </a:custGeom>
-            <a:solidFill>
-              <a:schemeClr val="accent1">
-                <a:lumMod val="75000"/>
-              </a:schemeClr>
-            </a:solidFill>
-            <a:ln>
-              <a:noFill/>
-            </a:ln>
-          </p:spPr>
-        </p:sp>
-        <p:sp>
-          <p:nvSpPr>
-            <p:cNvPr id="17" name="Freeform 11">
-              <a:extLst>
-                <a:ext uri="{FF2B5EF4-FFF2-40B4-BE49-F238E27FC236}">
-                  <a16:creationId xmlns:a16="http://schemas.microsoft.com/office/drawing/2014/main" id="{20A090B2-5344-43CD-BC70-A6D44F15E800}"/>
-                </a:ext>
-                <a:ext uri="{C183D7F6-B498-43B3-948B-1728B52AA6E4}">
-                  <adec:decorative xmlns:adec="http://schemas.microsoft.com/office/drawing/2017/decorative" val="1"/>
-                </a:ext>
-              </a:extLst>
-            </p:cNvPr>
-            <p:cNvSpPr/>
-            <p:nvPr>
-              <p:extLst>
-                <p:ext uri="{386F3935-93C4-4BCD-93E2-E3B085C9AB24}">
-                  <p16:designElem xmlns:p16="http://schemas.microsoft.com/office/powerpoint/2015/main" val="1"/>
-                </p:ext>
-              </p:extLst>
-            </p:nvPr>
-          </p:nvSpPr>
-          <p:spPr bwMode="auto">
-            <a:xfrm>
-              <a:off x="1320800" y="5238750"/>
-              <a:ext cx="1695450" cy="1619250"/>
-            </a:xfrm>
-            <a:custGeom>
-              <a:avLst/>
-              <a:gdLst/>
-              <a:ahLst/>
-              <a:cxnLst/>
-              <a:rect l="0" t="0" r="r" b="b"/>
-              <a:pathLst>
-                <a:path w="1068" h="1020">
-                  <a:moveTo>
-                    <a:pt x="1068" y="1020"/>
-                  </a:moveTo>
-                  <a:lnTo>
-                    <a:pt x="184" y="60"/>
-                  </a:lnTo>
-                  <a:lnTo>
-                    <a:pt x="154" y="27"/>
-                  </a:lnTo>
-                  <a:lnTo>
-                    <a:pt x="157" y="27"/>
-                  </a:lnTo>
-                  <a:lnTo>
-                    <a:pt x="157" y="24"/>
-                  </a:lnTo>
-                  <a:lnTo>
-                    <a:pt x="154" y="24"/>
-                  </a:lnTo>
-                  <a:lnTo>
-                    <a:pt x="0" y="0"/>
-                  </a:lnTo>
-                  <a:lnTo>
-                    <a:pt x="0" y="0"/>
-                  </a:lnTo>
-                  <a:lnTo>
-                    <a:pt x="774" y="1020"/>
-                  </a:lnTo>
-                  <a:lnTo>
-                    <a:pt x="1068" y="1020"/>
-                  </a:lnTo>
-                  <a:close/>
-                </a:path>
-              </a:pathLst>
-            </a:custGeom>
-            <a:solidFill>
-              <a:schemeClr val="tx1">
-                <a:lumMod val="75000"/>
-                <a:lumOff val="25000"/>
-              </a:schemeClr>
-            </a:solidFill>
-            <a:ln>
-              <a:noFill/>
-            </a:ln>
-          </p:spPr>
-        </p:sp>
-      </p:grpSp>
-      <p:sp>
-        <p:nvSpPr>
-          <p:cNvPr id="2" name="Cím 1">
-            <a:extLst>
-              <a:ext uri="{FF2B5EF4-FFF2-40B4-BE49-F238E27FC236}">
-                <a16:creationId xmlns:a16="http://schemas.microsoft.com/office/drawing/2014/main" id="{B1D0DD9E-ED62-DD25-7EEE-8F6E1E8BF6B9}"/>
-              </a:ext>
-            </a:extLst>
-          </p:cNvPr>
-          <p:cNvSpPr>
-            <a:spLocks noGrp="1"/>
-          </p:cNvSpPr>
-          <p:nvPr>
-            <p:ph type="title"/>
-          </p:nvPr>
-        </p:nvSpPr>
-        <p:spPr>
-          <a:xfrm>
-            <a:off x="972080" y="685800"/>
-            <a:ext cx="5260680" cy="1752599"/>
-          </a:xfrm>
-        </p:spPr>
-        <p:txBody>
-          <a:bodyPr>
-            <a:normAutofit/>
-          </a:bodyPr>
-          <a:lstStyle/>
-          <a:p>
-            <a:pPr algn="l"/>
-            <a:r>
-              <a:rPr lang="hu-HU" b="1" dirty="0">
-                <a:cs typeface="Calibri Light"/>
-              </a:rPr>
-              <a:t>Fejlesztés</a:t>
-            </a:r>
-            <a:endParaRPr lang="hu-HU" b="1"/>
-          </a:p>
-        </p:txBody>
-      </p:sp>
-      <p:sp>
-        <p:nvSpPr>
-          <p:cNvPr id="3" name="Tartalom helye 2">
-            <a:extLst>
-              <a:ext uri="{FF2B5EF4-FFF2-40B4-BE49-F238E27FC236}">
-                <a16:creationId xmlns:a16="http://schemas.microsoft.com/office/drawing/2014/main" id="{39EE08E8-F78C-7385-5258-D15CEBFEB9AF}"/>
-              </a:ext>
-            </a:extLst>
-          </p:cNvPr>
-          <p:cNvSpPr>
-            <a:spLocks noGrp="1"/>
-          </p:cNvSpPr>
-          <p:nvPr>
-            <p:ph idx="1"/>
-          </p:nvPr>
-        </p:nvSpPr>
-        <p:spPr>
-          <a:xfrm>
-            <a:off x="643468" y="2666999"/>
-            <a:ext cx="5721890" cy="3124201"/>
-          </a:xfrm>
-        </p:spPr>
-        <p:txBody>
-          <a:bodyPr vert="horz" lIns="91440" tIns="45720" rIns="91440" bIns="45720" rtlCol="0">
-            <a:normAutofit/>
-          </a:bodyPr>
-          <a:lstStyle/>
-          <a:p>
-            <a:r>
-              <a:rPr lang="hu-HU" sz="2800" dirty="0">
-                <a:latin typeface="Arial"/>
-                <a:cs typeface="Arial"/>
-              </a:rPr>
-              <a:t>A modell a Google </a:t>
-            </a:r>
-            <a:r>
-              <a:rPr lang="hu-HU" sz="2800" err="1">
-                <a:latin typeface="Arial"/>
-                <a:cs typeface="Arial"/>
-              </a:rPr>
-              <a:t>Colab</a:t>
-            </a:r>
-            <a:r>
-              <a:rPr lang="hu-HU" sz="2800" dirty="0">
-                <a:latin typeface="Arial"/>
-                <a:cs typeface="Arial"/>
-              </a:rPr>
-              <a:t> használatával készült el</a:t>
-            </a:r>
-            <a:endParaRPr lang="en-US" sz="2800">
-              <a:latin typeface="Arial"/>
-              <a:cs typeface="Arial"/>
-            </a:endParaRPr>
-          </a:p>
-          <a:p>
-            <a:r>
-              <a:rPr lang="hu-HU" sz="2800" dirty="0">
-                <a:latin typeface="Arial"/>
-                <a:cs typeface="Arial"/>
-              </a:rPr>
-              <a:t>Segédanyagok forrásai: </a:t>
-            </a:r>
-            <a:r>
-              <a:rPr lang="hu-HU" sz="2800" dirty="0" err="1">
-                <a:latin typeface="Arial"/>
-                <a:cs typeface="Arial"/>
-              </a:rPr>
-              <a:t>google</a:t>
-            </a:r>
-            <a:r>
-              <a:rPr lang="hu-HU" sz="2800" dirty="0">
-                <a:latin typeface="Arial"/>
-                <a:cs typeface="Arial"/>
-              </a:rPr>
-              <a:t>, </a:t>
-            </a:r>
-            <a:r>
-              <a:rPr lang="hu-HU" sz="2800" dirty="0" err="1">
-                <a:latin typeface="Arial"/>
-                <a:cs typeface="Arial"/>
-              </a:rPr>
-              <a:t>youtube</a:t>
-            </a:r>
-            <a:r>
-              <a:rPr lang="hu-HU" sz="2800" dirty="0">
-                <a:latin typeface="Arial"/>
-                <a:cs typeface="Arial"/>
-              </a:rPr>
-              <a:t>, </a:t>
-            </a:r>
-            <a:r>
-              <a:rPr lang="hu-HU" sz="2800" dirty="0" err="1">
-                <a:latin typeface="Arial"/>
-                <a:cs typeface="Arial"/>
-              </a:rPr>
-              <a:t>kaggle</a:t>
-            </a:r>
-            <a:r>
-              <a:rPr lang="hu-HU" sz="2800" dirty="0">
-                <a:latin typeface="Arial"/>
-                <a:cs typeface="Arial"/>
-              </a:rPr>
-              <a:t>, </a:t>
-            </a:r>
-            <a:r>
-              <a:rPr lang="hu-HU" sz="2800" dirty="0" err="1">
-                <a:latin typeface="Arial"/>
-                <a:cs typeface="Arial"/>
-              </a:rPr>
-              <a:t>chatgpt</a:t>
-            </a:r>
-            <a:r>
-              <a:rPr lang="hu-HU" sz="2800" dirty="0">
-                <a:latin typeface="Arial"/>
-                <a:cs typeface="Arial"/>
-              </a:rPr>
-              <a:t>, </a:t>
-            </a:r>
-            <a:r>
-              <a:rPr lang="hu-HU" sz="2800" dirty="0" err="1">
-                <a:latin typeface="Arial"/>
-                <a:cs typeface="Arial"/>
-              </a:rPr>
-              <a:t>stackoverflow</a:t>
-            </a:r>
-            <a:endParaRPr lang="hu-HU" dirty="0" err="1">
-              <a:latin typeface="Arial"/>
-              <a:cs typeface="Arial"/>
-            </a:endParaRPr>
-          </a:p>
-          <a:p>
-            <a:endParaRPr lang="hu-HU" sz="2000">
-              <a:latin typeface="Calibri" panose="020F0502020204030204"/>
-              <a:cs typeface="Calibri"/>
-            </a:endParaRPr>
-          </a:p>
-        </p:txBody>
-      </p:sp>
-    </p:spTree>
-    <p:extLst>
-      <p:ext uri="{BB962C8B-B14F-4D97-AF65-F5344CB8AC3E}">
-        <p14:creationId xmlns:p14="http://schemas.microsoft.com/office/powerpoint/2010/main" val="549356452"/>
-      </p:ext>
-    </p:extLst>
-  </p:cSld>
-  <p:clrMapOvr>
-    <a:masterClrMapping/>
-  </p:clrMapOvr>
-</p:sld>
-</file>
-
-<file path=ppt/slides/slide4.xml><?xml version="1.0" encoding="utf-8"?>
-<p:sld xmlns:a="http://schemas.openxmlformats.org/drawingml/2006/main" xmlns:r="http://schemas.openxmlformats.org/officeDocument/2006/relationships" xmlns:p="http://schemas.openxmlformats.org/presentationml/2006/main">
-  <p:cSld>
-    <p:spTree>
-      <p:nvGrpSpPr>
-        <p:cNvPr id="1" name=""/>
-        <p:cNvGrpSpPr/>
-        <p:nvPr/>
-      </p:nvGrpSpPr>
-      <p:grpSpPr>
-        <a:xfrm>
-          <a:off x="0" y="0"/>
-          <a:ext cx="0" cy="0"/>
-          <a:chOff x="0" y="0"/>
-          <a:chExt cx="0" cy="0"/>
-        </a:xfrm>
-      </p:grpSpPr>
       <p:sp>
         <p:nvSpPr>
           <p:cNvPr id="2" name="Cím 1">
@@ -8370,7 +7612,7 @@
           <a:lstStyle/>
           <a:p>
             <a:r>
-              <a:rPr lang="hu-HU" dirty="0" err="1"/>
+              <a:rPr lang="hu-HU" err="1"/>
               <a:t>Dataset</a:t>
             </a:r>
           </a:p>
@@ -8403,7 +7645,7 @@
           <a:lstStyle/>
           <a:p>
             <a:r>
-              <a:rPr lang="hu-HU" sz="2700" b="1" dirty="0">
+              <a:rPr lang="hu-HU" sz="2700" b="1">
                 <a:solidFill>
                   <a:srgbClr val="202124"/>
                 </a:solidFill>
@@ -8411,7 +7653,7 @@
               <a:t>Formula 1 World </a:t>
             </a:r>
             <a:r>
-              <a:rPr lang="hu-HU" sz="2700" b="1" dirty="0" err="1">
+              <a:rPr lang="hu-HU" sz="2700" b="1" err="1">
                 <a:solidFill>
                   <a:srgbClr val="202124"/>
                 </a:solidFill>
@@ -8419,14 +7661,14 @@
               <a:t>Championship</a:t>
             </a:r>
             <a:r>
-              <a:rPr lang="hu-HU" sz="2700" b="1" dirty="0">
+              <a:rPr lang="hu-HU" sz="2700" b="1">
                 <a:solidFill>
                   <a:srgbClr val="202124"/>
                 </a:solidFill>
               </a:rPr>
               <a:t> (1950 - 2023)</a:t>
             </a:r>
-            <a:endParaRPr lang="hu-HU" dirty="0"/>
+            <a:endParaRPr lang="hu-HU"/>
           </a:p>
           <a:p>
             <a:pPr lvl="1">
@@ -8435,55 +7677,55 @@
               </a:buClr>
             </a:pPr>
             <a:r>
-              <a:rPr lang="hu-HU" dirty="0" err="1"/>
+              <a:rPr lang="hu-HU" err="1"/>
               <a:t>drivers</a:t>
             </a:r>
             <a:r>
-              <a:rPr lang="hu-HU" dirty="0"/>
+              <a:rPr lang="hu-HU"/>
               <a:t>, </a:t>
             </a:r>
             <a:r>
-              <a:rPr lang="hu-HU" dirty="0" err="1"/>
+              <a:rPr lang="hu-HU" err="1"/>
               <a:t>driver_result</a:t>
             </a:r>
             <a:r>
-              <a:rPr lang="hu-HU" dirty="0"/>
+              <a:rPr lang="hu-HU"/>
               <a:t>, </a:t>
             </a:r>
             <a:r>
-              <a:rPr lang="hu-HU" dirty="0" err="1"/>
+              <a:rPr lang="hu-HU" err="1"/>
               <a:t>races</a:t>
             </a:r>
             <a:r>
-              <a:rPr lang="hu-HU" dirty="0"/>
+              <a:rPr lang="hu-HU"/>
               <a:t>, </a:t>
             </a:r>
             <a:r>
-              <a:rPr lang="hu-HU" dirty="0" err="1"/>
+              <a:rPr lang="hu-HU" err="1"/>
               <a:t>circuits</a:t>
             </a:r>
             <a:r>
-              <a:rPr lang="hu-HU" dirty="0"/>
+              <a:rPr lang="hu-HU"/>
               <a:t>, </a:t>
             </a:r>
             <a:r>
-              <a:rPr lang="hu-HU" dirty="0" err="1"/>
+              <a:rPr lang="hu-HU" err="1"/>
               <a:t>driver_standings</a:t>
             </a:r>
             <a:r>
-              <a:rPr lang="hu-HU" dirty="0"/>
+              <a:rPr lang="hu-HU"/>
               <a:t>, </a:t>
             </a:r>
             <a:r>
-              <a:rPr lang="hu-HU" dirty="0" err="1"/>
+              <a:rPr lang="hu-HU" err="1"/>
               <a:t>laptimes</a:t>
             </a:r>
             <a:r>
-              <a:rPr lang="hu-HU" dirty="0"/>
+              <a:rPr lang="hu-HU"/>
               <a:t>, </a:t>
             </a:r>
             <a:r>
-              <a:rPr lang="hu-HU" dirty="0" err="1"/>
+              <a:rPr lang="hu-HU" err="1"/>
               <a:t>qualifying</a:t>
             </a:r>
             <a:endParaRPr lang="hu-HU"/>
@@ -8495,23 +7737,23 @@
               </a:buClr>
             </a:pPr>
             <a:r>
-              <a:rPr lang="hu-HU" dirty="0" err="1"/>
+              <a:rPr lang="hu-HU" err="1"/>
               <a:t>WinRate</a:t>
             </a:r>
             <a:r>
-              <a:rPr lang="hu-HU" dirty="0"/>
+              <a:rPr lang="hu-HU"/>
               <a:t>, </a:t>
             </a:r>
             <a:r>
-              <a:rPr lang="hu-HU" dirty="0" err="1"/>
+              <a:rPr lang="hu-HU" err="1"/>
               <a:t>fastestLapRate</a:t>
             </a:r>
             <a:r>
-              <a:rPr lang="hu-HU" dirty="0"/>
+              <a:rPr lang="hu-HU"/>
               <a:t>, </a:t>
             </a:r>
             <a:r>
-              <a:rPr lang="hu-HU" dirty="0" err="1"/>
+              <a:rPr lang="hu-HU" err="1"/>
               <a:t>qualifyingRate</a:t>
             </a:r>
           </a:p>
@@ -8806,7 +8048,7 @@
 </p:sld>
 </file>
 
-<file path=ppt/slides/slide5.xml><?xml version="1.0" encoding="utf-8"?>
+<file path=ppt/slides/slide4.xml><?xml version="1.0" encoding="utf-8"?>
 <p:sld xmlns:a="http://schemas.openxmlformats.org/drawingml/2006/main" xmlns:r="http://schemas.openxmlformats.org/officeDocument/2006/relationships" xmlns:p="http://schemas.openxmlformats.org/presentationml/2006/main">
   <p:cSld>
     <p:spTree>
@@ -8845,7 +8087,7 @@
           <a:lstStyle/>
           <a:p>
             <a:r>
-              <a:rPr lang="hu-HU" dirty="0"/>
+              <a:rPr lang="hu-HU"/>
               <a:t>Modellek pontossága</a:t>
             </a:r>
           </a:p>
@@ -8942,15 +8184,15 @@
           <a:lstStyle/>
           <a:p>
             <a:r>
-              <a:rPr lang="hu-HU" dirty="0"/>
+              <a:rPr lang="hu-HU"/>
               <a:t>MinMax </a:t>
             </a:r>
             <a:r>
-              <a:rPr lang="hu-HU" dirty="0" err="1"/>
+              <a:rPr lang="hu-HU" err="1"/>
               <a:t>Scaler</a:t>
             </a:r>
             <a:r>
-              <a:rPr lang="hu-HU" dirty="0"/>
+              <a:rPr lang="hu-HU"/>
               <a:t> + eredmény</a:t>
             </a:r>
           </a:p>
@@ -9078,15 +8320,15 @@
           <a:lstStyle/>
           <a:p>
             <a:r>
-              <a:rPr lang="hu-HU" dirty="0"/>
+              <a:rPr lang="hu-HU"/>
               <a:t>Standard </a:t>
             </a:r>
             <a:r>
-              <a:rPr lang="hu-HU" dirty="0" err="1"/>
+              <a:rPr lang="hu-HU" err="1"/>
               <a:t>Scaler</a:t>
             </a:r>
             <a:r>
-              <a:rPr lang="hu-HU" dirty="0"/>
+              <a:rPr lang="hu-HU"/>
               <a:t> + eredmény</a:t>
             </a:r>
           </a:p>
@@ -9124,11 +8366,11 @@
           <a:lstStyle/>
           <a:p>
             <a:r>
-              <a:rPr lang="hu-HU" dirty="0"/>
+              <a:rPr lang="hu-HU"/>
               <a:t>Alap </a:t>
             </a:r>
             <a:r>
-              <a:rPr lang="hu-HU" dirty="0" err="1"/>
+              <a:rPr lang="hu-HU" err="1"/>
               <a:t>model</a:t>
             </a:r>
           </a:p>
@@ -9147,7 +8389,7 @@
 </p:sld>
 </file>
 
-<file path=ppt/slides/slide6.xml><?xml version="1.0" encoding="utf-8"?>
+<file path=ppt/slides/slide5.xml><?xml version="1.0" encoding="utf-8"?>
 <p:sld xmlns:a="http://schemas.openxmlformats.org/drawingml/2006/main" xmlns:r="http://schemas.openxmlformats.org/officeDocument/2006/relationships" xmlns:p="http://schemas.openxmlformats.org/presentationml/2006/main">
   <p:cSld>
     <p:spTree>
@@ -9191,7 +8433,7 @@
           <a:lstStyle/>
           <a:p>
             <a:r>
-              <a:rPr lang="hu-HU" b="1" dirty="0"/>
+              <a:rPr lang="hu-HU" b="1"/>
               <a:t>Valós teszt</a:t>
             </a:r>
           </a:p>
@@ -9239,7 +8481,7 @@
 </p:sld>
 </file>
 
-<file path=ppt/slides/slide7.xml><?xml version="1.0" encoding="utf-8"?>
+<file path=ppt/slides/slide6.xml><?xml version="1.0" encoding="utf-8"?>
 <p:sld xmlns:a="http://schemas.openxmlformats.org/drawingml/2006/main" xmlns:r="http://schemas.openxmlformats.org/officeDocument/2006/relationships" xmlns:p="http://schemas.openxmlformats.org/presentationml/2006/main">
   <p:cSld>
     <p:spTree>
@@ -9283,7 +8525,7 @@
           <a:lstStyle/>
           <a:p>
             <a:r>
-              <a:rPr lang="hu-HU" b="1" dirty="0"/>
+              <a:rPr lang="hu-HU" b="1"/>
               <a:t>Eredmények</a:t>
             </a:r>
           </a:p>
@@ -9316,15 +8558,15 @@
           <a:lstStyle/>
           <a:p>
             <a:r>
-              <a:rPr lang="hu-HU" dirty="0"/>
+              <a:rPr lang="hu-HU"/>
               <a:t>A </a:t>
             </a:r>
             <a:r>
-              <a:rPr lang="hu-HU" dirty="0" err="1"/>
+              <a:rPr lang="hu-HU" err="1"/>
               <a:t>prediciók</a:t>
             </a:r>
             <a:r>
-              <a:rPr lang="hu-HU" dirty="0"/>
+              <a:rPr lang="hu-HU"/>
               <a:t> eredményei nagyjából egy randomgenerátoréval egyenlőek.</a:t>
             </a:r>
           </a:p>
@@ -9362,7 +8604,7 @@
           <a:lstStyle/>
           <a:p>
             <a:r>
-              <a:rPr lang="hu-HU" dirty="0" err="1">
+              <a:rPr lang="hu-HU" err="1">
                 <a:solidFill>
                   <a:srgbClr val="000000"/>
                 </a:solidFill>
@@ -9371,7 +8613,7 @@
               </a:rPr>
               <a:t>LogisticRegression</a:t>
             </a:r>
-            <a:endParaRPr lang="hu-HU" dirty="0" err="1"/>
+            <a:endParaRPr lang="hu-HU" err="1"/>
           </a:p>
         </p:txBody>
       </p:sp>
@@ -9407,7 +8649,7 @@
           <a:lstStyle/>
           <a:p>
             <a:r>
-              <a:rPr lang="hu-HU" dirty="0" err="1">
+              <a:rPr lang="hu-HU" err="1">
                 <a:solidFill>
                   <a:srgbClr val="000000"/>
                 </a:solidFill>
@@ -9416,7 +8658,7 @@
               </a:rPr>
               <a:t>SGDClassifier</a:t>
             </a:r>
-            <a:endParaRPr lang="hu-HU" dirty="0" err="1"/>
+            <a:endParaRPr lang="hu-HU" err="1"/>
           </a:p>
         </p:txBody>
       </p:sp>
@@ -9452,7 +8694,7 @@
           <a:lstStyle/>
           <a:p>
             <a:r>
-              <a:rPr lang="hu-HU" dirty="0" err="1">
+              <a:rPr lang="hu-HU" err="1">
                 <a:solidFill>
                   <a:srgbClr val="000000"/>
                 </a:solidFill>
@@ -9461,7 +8703,7 @@
               </a:rPr>
               <a:t>KNeighborsClassifier</a:t>
             </a:r>
-            <a:endParaRPr lang="hu-HU" dirty="0" err="1"/>
+            <a:endParaRPr lang="hu-HU" err="1"/>
           </a:p>
         </p:txBody>
       </p:sp>
@@ -9497,7 +8739,7 @@
           <a:lstStyle/>
           <a:p>
             <a:r>
-              <a:rPr lang="hu-HU" dirty="0" err="1">
+              <a:rPr lang="hu-HU" err="1">
                 <a:solidFill>
                   <a:srgbClr val="000000"/>
                 </a:solidFill>
@@ -9506,7 +8748,7 @@
               </a:rPr>
               <a:t>GaussianNB</a:t>
             </a:r>
-            <a:endParaRPr lang="hu-HU" dirty="0" err="1"/>
+            <a:endParaRPr lang="hu-HU" err="1"/>
           </a:p>
         </p:txBody>
       </p:sp>
@@ -9543,7 +8785,7 @@
           <a:p>
             <a:pPr algn="l"/>
             <a:r>
-              <a:rPr lang="hu-HU" dirty="0" err="1">
+              <a:rPr lang="hu-HU" err="1">
                 <a:solidFill>
                   <a:srgbClr val="000000"/>
                 </a:solidFill>
@@ -9552,7 +8794,7 @@
               </a:rPr>
               <a:t>RandomForestClassifier</a:t>
             </a:r>
-            <a:endParaRPr lang="hu-HU" dirty="0" err="1"/>
+            <a:endParaRPr lang="hu-HU" err="1"/>
           </a:p>
         </p:txBody>
       </p:sp>
@@ -9589,7 +8831,7 @@
           <a:p>
             <a:pPr algn="l"/>
             <a:r>
-              <a:rPr lang="hu-HU" dirty="0" err="1">
+              <a:rPr lang="hu-HU" err="1">
                 <a:solidFill>
                   <a:srgbClr val="000000"/>
                 </a:solidFill>
@@ -9598,7 +8840,7 @@
               </a:rPr>
               <a:t>DecisionTreeClassifier</a:t>
             </a:r>
-            <a:endParaRPr lang="hu-HU" dirty="0" err="1"/>
+            <a:endParaRPr lang="hu-HU" err="1"/>
           </a:p>
         </p:txBody>
       </p:sp>
@@ -10011,7 +9253,7 @@
 </p:sld>
 </file>
 
-<file path=ppt/slides/slide8.xml><?xml version="1.0" encoding="utf-8"?>
+<file path=ppt/slides/slide7.xml><?xml version="1.0" encoding="utf-8"?>
 <p:sld xmlns:a="http://schemas.openxmlformats.org/drawingml/2006/main" xmlns:r="http://schemas.openxmlformats.org/officeDocument/2006/relationships" xmlns:p="http://schemas.openxmlformats.org/presentationml/2006/main">
   <p:cSld>
     <p:spTree>
@@ -10055,12 +9297,12 @@
           <a:lstStyle/>
           <a:p>
             <a:r>
-              <a:rPr lang="hu-HU" b="1" dirty="0">
+              <a:rPr lang="hu-HU" b="1">
                 <a:cs typeface="Calibri Light"/>
               </a:rPr>
               <a:t>Felhasználói felület</a:t>
             </a:r>
-            <a:endParaRPr lang="hu-HU" b="1" dirty="0"/>
+            <a:endParaRPr lang="hu-HU" b="1"/>
           </a:p>
         </p:txBody>
       </p:sp>
@@ -10205,7 +9447,7 @@
           <a:p>
             <a:pPr algn="ctr"/>
             <a:r>
-              <a:rPr lang="hu-HU" sz="8000" b="1" dirty="0">
+              <a:rPr lang="hu-HU" sz="8000" b="1">
                 <a:solidFill>
                   <a:schemeClr val="bg1"/>
                 </a:solidFill>
@@ -10268,7 +9510,7 @@
           <a:p>
             <a:pPr algn="ctr"/>
             <a:r>
-              <a:rPr lang="hu-HU" sz="9600" b="1" dirty="0">
+              <a:rPr lang="hu-HU" sz="9600" b="1">
                 <a:latin typeface="Aharoni"/>
                 <a:cs typeface="Calibri"/>
                 <a:hlinkClick r:id="rId2"/>
@@ -10282,7 +9524,7 @@
           <a:p>
             <a:pPr algn="ctr"/>
             <a:r>
-              <a:rPr lang="hu-HU" sz="9600" b="1" dirty="0">
+              <a:rPr lang="hu-HU" sz="9600" b="1">
                 <a:latin typeface="Aharoni"/>
                 <a:cs typeface="Calibri"/>
                 <a:hlinkClick r:id="rId2"/>
@@ -10305,7 +9547,7 @@
 </p:sld>
 </file>
 
-<file path=ppt/slides/slide9.xml><?xml version="1.0" encoding="utf-8"?>
+<file path=ppt/slides/slide8.xml><?xml version="1.0" encoding="utf-8"?>
 <p:sld xmlns:a="http://schemas.openxmlformats.org/drawingml/2006/main" xmlns:r="http://schemas.openxmlformats.org/officeDocument/2006/relationships" xmlns:p="http://schemas.openxmlformats.org/presentationml/2006/main">
   <p:cSld>
     <p:spTree>
@@ -10344,12 +9586,12 @@
           <a:lstStyle/>
           <a:p>
             <a:r>
-              <a:rPr lang="hu-HU" dirty="0">
+              <a:rPr lang="hu-HU">
                 <a:cs typeface="Calibri Light"/>
               </a:rPr>
               <a:t>Források</a:t>
             </a:r>
-            <a:endParaRPr lang="hu-HU" dirty="0"/>
+            <a:endParaRPr lang="hu-HU"/>
           </a:p>
         </p:txBody>
       </p:sp>
@@ -10377,14 +9619,14 @@
           <a:lstStyle/>
           <a:p>
             <a:r>
-              <a:rPr lang="hu-HU" dirty="0">
+              <a:rPr lang="hu-HU">
                 <a:ea typeface="+mn-lt"/>
                 <a:cs typeface="+mn-lt"/>
               </a:rPr>
               <a:t> </a:t>
             </a:r>
             <a:r>
-              <a:rPr lang="hu-HU" dirty="0">
+              <a:rPr lang="hu-HU">
                 <a:ea typeface="+mn-lt"/>
                 <a:cs typeface="+mn-lt"/>
                 <a:hlinkClick r:id="rId2"/>
@@ -10400,14 +9642,14 @@
               </a:buClr>
             </a:pPr>
             <a:r>
-              <a:rPr lang="hu-HU" dirty="0">
+              <a:rPr lang="hu-HU">
                 <a:ea typeface="+mn-lt"/>
                 <a:cs typeface="+mn-lt"/>
               </a:rPr>
               <a:t> </a:t>
             </a:r>
             <a:r>
-              <a:rPr lang="hu-HU" dirty="0">
+              <a:rPr lang="hu-HU">
                 <a:ea typeface="+mn-lt"/>
                 <a:cs typeface="+mn-lt"/>
                 <a:hlinkClick r:id="rId3"/>
@@ -10423,14 +9665,14 @@
               </a:buClr>
             </a:pPr>
             <a:r>
-              <a:rPr lang="hu-HU" dirty="0">
+              <a:rPr lang="hu-HU">
                 <a:ea typeface="+mn-lt"/>
                 <a:cs typeface="+mn-lt"/>
               </a:rPr>
               <a:t> </a:t>
             </a:r>
             <a:r>
-              <a:rPr lang="hu-HU" dirty="0">
+              <a:rPr lang="hu-HU">
                 <a:ea typeface="+mn-lt"/>
                 <a:cs typeface="+mn-lt"/>
                 <a:hlinkClick r:id="rId4"/>
@@ -10446,14 +9688,14 @@
               </a:buClr>
             </a:pPr>
             <a:r>
-              <a:rPr lang="hu-HU" dirty="0">
+              <a:rPr lang="hu-HU">
                 <a:ea typeface="+mn-lt"/>
                 <a:cs typeface="+mn-lt"/>
               </a:rPr>
               <a:t> </a:t>
             </a:r>
             <a:r>
-              <a:rPr lang="hu-HU" dirty="0">
+              <a:rPr lang="hu-HU">
                 <a:ea typeface="+mn-lt"/>
                 <a:cs typeface="+mn-lt"/>
                 <a:hlinkClick r:id="rId5"/>
@@ -10469,7 +9711,7 @@
               </a:buClr>
             </a:pPr>
             <a:r>
-              <a:rPr lang="hu-HU" sz="2600" dirty="0">
+              <a:rPr lang="hu-HU" sz="2600">
                 <a:solidFill>
                   <a:srgbClr val="0563C1"/>
                 </a:solidFill>
@@ -10481,7 +9723,7 @@
               <a:t>https://openai.com/blog/chatgpt</a:t>
             </a:r>
             <a:r>
-              <a:rPr lang="hu-HU" sz="2600" dirty="0">
+              <a:rPr lang="hu-HU" sz="2600">
                 <a:latin typeface="Calibri"/>
                 <a:ea typeface="+mn-lt"/>
                 <a:cs typeface="Calibri"/>
@@ -10496,14 +9738,14 @@
               </a:buClr>
             </a:pPr>
             <a:r>
-              <a:rPr lang="hu-HU" sz="2600" dirty="0">
+              <a:rPr lang="hu-HU" sz="2600">
                 <a:ea typeface="+mn-lt"/>
                 <a:cs typeface="+mn-lt"/>
                 <a:hlinkClick r:id="rId7"/>
               </a:rPr>
               <a:t>https://www.kaggle.com/code/anandaramg/f1-champ-eda-classification-100-accuracy/comments</a:t>
             </a:r>
-            <a:endParaRPr lang="hu-HU" sz="2600" dirty="0">
+            <a:endParaRPr lang="hu-HU" sz="2600">
               <a:latin typeface="Calibri"/>
               <a:cs typeface="Calibri"/>
             </a:endParaRPr>
@@ -10515,14 +9757,14 @@
               </a:buClr>
             </a:pPr>
             <a:r>
-              <a:rPr lang="hu-HU" sz="2600" dirty="0">
+              <a:rPr lang="hu-HU" sz="2600">
                 <a:ea typeface="+mn-lt"/>
                 <a:cs typeface="+mn-lt"/>
                 <a:hlinkClick r:id="rId8"/>
               </a:rPr>
               <a:t>https://machinelearningmastery.com/overfitting-machine-learning-models/</a:t>
             </a:r>
-            <a:endParaRPr lang="hu-HU" sz="2600" dirty="0">
+            <a:endParaRPr lang="hu-HU" sz="2600">
               <a:latin typeface="Corbel"/>
               <a:cs typeface="Calibri"/>
             </a:endParaRPr>
@@ -10533,7 +9775,7 @@
                 <a:srgbClr val="1287C3"/>
               </a:buClr>
             </a:pPr>
-            <a:endParaRPr lang="hu-HU" sz="2600" dirty="0">
+            <a:endParaRPr lang="hu-HU" sz="2600">
               <a:latin typeface="Corbel"/>
               <a:cs typeface="Calibri"/>
             </a:endParaRPr>
@@ -10544,7 +9786,7 @@
                 <a:srgbClr val="1287C3"/>
               </a:buClr>
             </a:pPr>
-            <a:endParaRPr lang="hu-HU" sz="2600" dirty="0">
+            <a:endParaRPr lang="hu-HU" sz="2600">
               <a:latin typeface="Calibri"/>
               <a:cs typeface="Calibri"/>
             </a:endParaRPr>
@@ -10555,7 +9797,7 @@
                 <a:srgbClr val="1287C3"/>
               </a:buClr>
             </a:pPr>
-            <a:endParaRPr lang="hu-HU" sz="2600" dirty="0">
+            <a:endParaRPr lang="hu-HU" sz="2600">
               <a:latin typeface="Calibri"/>
               <a:cs typeface="Calibri"/>
             </a:endParaRPr>

</xml_diff>